<commit_message>
Demanda PETROLERO LSTM full y con normalizacion
</commit_message>
<xml_diff>
--- a/Diplomado_DS_Proyecto_Final/Proyecto_final_Diplomado_DS_UNAM_v1.pptx
+++ b/Diplomado_DS_Proyecto_Final/Proyecto_final_Diplomado_DS_UNAM_v1.pptx
@@ -5,16 +5,18 @@
     <p:sldMasterId id="2147483648" r:id="rId1"/>
   </p:sldMasterIdLst>
   <p:notesMasterIdLst>
-    <p:notesMasterId r:id="rId9"/>
+    <p:notesMasterId r:id="rId11"/>
   </p:notesMasterIdLst>
   <p:sldIdLst>
     <p:sldId id="256" r:id="rId2"/>
     <p:sldId id="257" r:id="rId3"/>
     <p:sldId id="258" r:id="rId4"/>
     <p:sldId id="260" r:id="rId5"/>
-    <p:sldId id="259" r:id="rId6"/>
-    <p:sldId id="262" r:id="rId7"/>
-    <p:sldId id="265" r:id="rId8"/>
+    <p:sldId id="266" r:id="rId6"/>
+    <p:sldId id="259" r:id="rId7"/>
+    <p:sldId id="267" r:id="rId8"/>
+    <p:sldId id="262" r:id="rId9"/>
+    <p:sldId id="265" r:id="rId10"/>
   </p:sldIdLst>
   <p:sldSz cx="12192000" cy="6858000"/>
   <p:notesSz cx="6858000" cy="9144000"/>
@@ -250,7 +252,7 @@
   <p:extLst>
     <p:ext uri="{EFAFB233-063F-42B5-8137-9DF3F51BA10A}">
       <p15:sldGuideLst xmlns:p15="http://schemas.microsoft.com/office/powerpoint/2012/main">
-        <p15:guide id="1" orient="horz" pos="3648" userDrawn="1">
+        <p15:guide id="1" orient="horz" pos="3552" userDrawn="1">
           <p15:clr>
             <a:srgbClr val="A4A3A4"/>
           </p15:clr>
@@ -263,7 +265,7 @@
       </p15:sldGuideLst>
     </p:ext>
     <p:ext uri="GoogleSlidesCustomDataVersion2">
-      <go:slidesCustomData xmlns:go="http://customooxmlschemas.google.com/" xmlns:ahyp="http://schemas.microsoft.com/office/drawing/2018/hyperlinkcolor" xmlns:p15="http://schemas.microsoft.com/office/powerpoint/2012/main" xmlns:p14="http://schemas.microsoft.com/office/powerpoint/2010/main" xmlns:com="http://schemas.openxmlformats.org/drawingml/2006/compatibility" xmlns:pvml="urn:schemas-microsoft-com:office:powerpoint" xmlns:v="urn:schemas-microsoft-com:vml" xmlns:o="urn:schemas-microsoft-com:office:office" xmlns:dgm="http://schemas.openxmlformats.org/drawingml/2006/diagram" xmlns:c="http://schemas.openxmlformats.org/drawingml/2006/chart" xmlns:mv="urn:schemas-microsoft-com:mac:vml" xmlns:mc="http://schemas.openxmlformats.org/markup-compatibility/2006" xmlns="" r:id="rId11" roundtripDataSignature="AMtx7mgHnMHIZxhnZr2j+tVR2DpQdbinhg=="/>
+      <go:slidesCustomData xmlns="" xmlns:mc="http://schemas.openxmlformats.org/markup-compatibility/2006" xmlns:mv="urn:schemas-microsoft-com:mac:vml" xmlns:c="http://schemas.openxmlformats.org/drawingml/2006/chart" xmlns:dgm="http://schemas.openxmlformats.org/drawingml/2006/diagram" xmlns:o="urn:schemas-microsoft-com:office:office" xmlns:v="urn:schemas-microsoft-com:vml" xmlns:pvml="urn:schemas-microsoft-com:office:powerpoint" xmlns:com="http://schemas.openxmlformats.org/drawingml/2006/compatibility" xmlns:p14="http://schemas.microsoft.com/office/powerpoint/2010/main" xmlns:p15="http://schemas.microsoft.com/office/powerpoint/2012/main" xmlns:ahyp="http://schemas.microsoft.com/office/drawing/2018/hyperlinkcolor" xmlns:go="http://customooxmlschemas.google.com/" r:id="rId12" roundtripDataSignature="AMtx7mgHnMHIZxhnZr2j+tVR2DpQdbinhg=="/>
     </p:ext>
   </p:extLst>
 </p:presentation>
@@ -2041,6 +2043,11 @@
         </p:spPr>
       </p:sp>
     </p:spTree>
+    <p:extLst>
+      <p:ext uri="{BB962C8B-B14F-4D97-AF65-F5344CB8AC3E}">
+        <p14:creationId xmlns:p14="http://schemas.microsoft.com/office/powerpoint/2010/main" val="767362698"/>
+      </p:ext>
+    </p:extLst>
   </p:cSld>
   <p:clrMapOvr>
     <a:masterClrMapping/>
@@ -2145,6 +2152,219 @@
         </p:spPr>
       </p:sp>
     </p:spTree>
+  </p:cSld>
+  <p:clrMapOvr>
+    <a:masterClrMapping/>
+  </p:clrMapOvr>
+</p:notes>
+</file>
+
+<file path=ppt/notesSlides/notesSlide7.xml><?xml version="1.0" encoding="utf-8"?>
+<p:notes xmlns:a="http://schemas.openxmlformats.org/drawingml/2006/main" xmlns:r="http://schemas.openxmlformats.org/officeDocument/2006/relationships" xmlns:p="http://schemas.openxmlformats.org/presentationml/2006/main" showMasterSp="0" showMasterPhAnim="0">
+  <p:cSld>
+    <p:spTree>
+      <p:nvGrpSpPr>
+        <p:cNvPr id="1" name="Shape 107"/>
+        <p:cNvGrpSpPr/>
+        <p:nvPr/>
+      </p:nvGrpSpPr>
+      <p:grpSpPr>
+        <a:xfrm>
+          <a:off x="0" y="0"/>
+          <a:ext cx="0" cy="0"/>
+          <a:chOff x="0" y="0"/>
+          <a:chExt cx="0" cy="0"/>
+        </a:xfrm>
+      </p:grpSpPr>
+      <p:sp>
+        <p:nvSpPr>
+          <p:cNvPr id="108" name="Google Shape;108;p4:notes"/>
+          <p:cNvSpPr txBox="1">
+            <a:spLocks noGrp="1"/>
+          </p:cNvSpPr>
+          <p:nvPr>
+            <p:ph type="body" idx="1"/>
+          </p:nvPr>
+        </p:nvSpPr>
+        <p:spPr>
+          <a:xfrm>
+            <a:off x="685800" y="4400550"/>
+            <a:ext cx="5486400" cy="3600450"/>
+          </a:xfrm>
+          <a:prstGeom prst="rect">
+            <a:avLst/>
+          </a:prstGeom>
+        </p:spPr>
+        <p:txBody>
+          <a:bodyPr spcFirstLastPara="1" wrap="square" lIns="91425" tIns="45700" rIns="91425" bIns="45700" anchor="t" anchorCtr="0">
+            <a:noAutofit/>
+          </a:bodyPr>
+          <a:lstStyle/>
+          <a:p>
+            <a:pPr marL="0" lvl="0" indent="0" algn="l" rtl="0">
+              <a:spcBef>
+                <a:spcPts val="0"/>
+              </a:spcBef>
+              <a:spcAft>
+                <a:spcPts val="0"/>
+              </a:spcAft>
+              <a:buNone/>
+            </a:pPr>
+            <a:endParaRPr/>
+          </a:p>
+        </p:txBody>
+      </p:sp>
+      <p:sp>
+        <p:nvSpPr>
+          <p:cNvPr id="109" name="Google Shape;109;p4:notes"/>
+          <p:cNvSpPr>
+            <a:spLocks noGrp="1" noRot="1" noChangeAspect="1"/>
+          </p:cNvSpPr>
+          <p:nvPr>
+            <p:ph type="sldImg" idx="2"/>
+          </p:nvPr>
+        </p:nvSpPr>
+        <p:spPr>
+          <a:xfrm>
+            <a:off x="685800" y="1143000"/>
+            <a:ext cx="5486400" cy="3086100"/>
+          </a:xfrm>
+          <a:custGeom>
+            <a:avLst/>
+            <a:gdLst/>
+            <a:ahLst/>
+            <a:cxnLst/>
+            <a:rect l="l" t="t" r="r" b="b"/>
+            <a:pathLst>
+              <a:path w="120000" h="120000" extrusionOk="0">
+                <a:moveTo>
+                  <a:pt x="0" y="0"/>
+                </a:moveTo>
+                <a:lnTo>
+                  <a:pt x="120000" y="0"/>
+                </a:lnTo>
+                <a:lnTo>
+                  <a:pt x="120000" y="120000"/>
+                </a:lnTo>
+                <a:lnTo>
+                  <a:pt x="0" y="120000"/>
+                </a:lnTo>
+                <a:close/>
+              </a:path>
+            </a:pathLst>
+          </a:custGeom>
+        </p:spPr>
+      </p:sp>
+    </p:spTree>
+    <p:extLst>
+      <p:ext uri="{BB962C8B-B14F-4D97-AF65-F5344CB8AC3E}">
+        <p14:creationId xmlns:p14="http://schemas.microsoft.com/office/powerpoint/2010/main" val="614612184"/>
+      </p:ext>
+    </p:extLst>
+  </p:cSld>
+  <p:clrMapOvr>
+    <a:masterClrMapping/>
+  </p:clrMapOvr>
+</p:notes>
+</file>
+
+<file path=ppt/notesSlides/notesSlide8.xml><?xml version="1.0" encoding="utf-8"?>
+<p:notes xmlns:a="http://schemas.openxmlformats.org/drawingml/2006/main" xmlns:r="http://schemas.openxmlformats.org/officeDocument/2006/relationships" xmlns:p="http://schemas.openxmlformats.org/presentationml/2006/main" showMasterSp="0" showMasterPhAnim="0">
+  <p:cSld>
+    <p:spTree>
+      <p:nvGrpSpPr>
+        <p:cNvPr id="1" name="Shape 107"/>
+        <p:cNvGrpSpPr/>
+        <p:nvPr/>
+      </p:nvGrpSpPr>
+      <p:grpSpPr>
+        <a:xfrm>
+          <a:off x="0" y="0"/>
+          <a:ext cx="0" cy="0"/>
+          <a:chOff x="0" y="0"/>
+          <a:chExt cx="0" cy="0"/>
+        </a:xfrm>
+      </p:grpSpPr>
+      <p:sp>
+        <p:nvSpPr>
+          <p:cNvPr id="108" name="Google Shape;108;p4:notes"/>
+          <p:cNvSpPr txBox="1">
+            <a:spLocks noGrp="1"/>
+          </p:cNvSpPr>
+          <p:nvPr>
+            <p:ph type="body" idx="1"/>
+          </p:nvPr>
+        </p:nvSpPr>
+        <p:spPr>
+          <a:xfrm>
+            <a:off x="685800" y="4400550"/>
+            <a:ext cx="5486400" cy="3600450"/>
+          </a:xfrm>
+          <a:prstGeom prst="rect">
+            <a:avLst/>
+          </a:prstGeom>
+        </p:spPr>
+        <p:txBody>
+          <a:bodyPr spcFirstLastPara="1" wrap="square" lIns="91425" tIns="45700" rIns="91425" bIns="45700" anchor="t" anchorCtr="0">
+            <a:noAutofit/>
+          </a:bodyPr>
+          <a:lstStyle/>
+          <a:p>
+            <a:pPr marL="0" lvl="0" indent="0" algn="l" rtl="0">
+              <a:spcBef>
+                <a:spcPts val="0"/>
+              </a:spcBef>
+              <a:spcAft>
+                <a:spcPts val="0"/>
+              </a:spcAft>
+              <a:buNone/>
+            </a:pPr>
+            <a:endParaRPr/>
+          </a:p>
+        </p:txBody>
+      </p:sp>
+      <p:sp>
+        <p:nvSpPr>
+          <p:cNvPr id="109" name="Google Shape;109;p4:notes"/>
+          <p:cNvSpPr>
+            <a:spLocks noGrp="1" noRot="1" noChangeAspect="1"/>
+          </p:cNvSpPr>
+          <p:nvPr>
+            <p:ph type="sldImg" idx="2"/>
+          </p:nvPr>
+        </p:nvSpPr>
+        <p:spPr>
+          <a:xfrm>
+            <a:off x="685800" y="1143000"/>
+            <a:ext cx="5486400" cy="3086100"/>
+          </a:xfrm>
+          <a:custGeom>
+            <a:avLst/>
+            <a:gdLst/>
+            <a:ahLst/>
+            <a:cxnLst/>
+            <a:rect l="l" t="t" r="r" b="b"/>
+            <a:pathLst>
+              <a:path w="120000" h="120000" extrusionOk="0">
+                <a:moveTo>
+                  <a:pt x="0" y="0"/>
+                </a:moveTo>
+                <a:lnTo>
+                  <a:pt x="120000" y="0"/>
+                </a:lnTo>
+                <a:lnTo>
+                  <a:pt x="120000" y="120000"/>
+                </a:lnTo>
+                <a:lnTo>
+                  <a:pt x="0" y="120000"/>
+                </a:lnTo>
+                <a:close/>
+              </a:path>
+            </a:pathLst>
+          </a:custGeom>
+        </p:spPr>
+      </p:sp>
+    </p:spTree>
     <p:extLst>
       <p:ext uri="{BB962C8B-B14F-4D97-AF65-F5344CB8AC3E}">
         <p14:creationId xmlns:p14="http://schemas.microsoft.com/office/powerpoint/2010/main" val="1103644168"/>
@@ -2157,7 +2377,7 @@
 </p:notes>
 </file>
 
-<file path=ppt/notesSlides/notesSlide7.xml><?xml version="1.0" encoding="utf-8"?>
+<file path=ppt/notesSlides/notesSlide9.xml><?xml version="1.0" encoding="utf-8"?>
 <p:notes xmlns:a="http://schemas.openxmlformats.org/drawingml/2006/main" xmlns:r="http://schemas.openxmlformats.org/officeDocument/2006/relationships" xmlns:p="http://schemas.openxmlformats.org/presentationml/2006/main" showMasterSp="0" showMasterPhAnim="0">
   <p:cSld>
     <p:spTree>
@@ -9072,10 +9292,11 @@
             </a:r>
           </a:p>
           <a:p>
-            <a:pPr marL="182880" lvl="0" indent="-182880">
-              <a:spcBef>
-                <a:spcPts val="0"/>
-              </a:spcBef>
+            <a:pPr marL="0" lvl="0" indent="0">
+              <a:spcBef>
+                <a:spcPts val="0"/>
+              </a:spcBef>
+              <a:buNone/>
             </a:pPr>
             <a:endParaRPr lang="es-MX" dirty="0">
               <a:solidFill>
@@ -9087,7 +9308,25 @@
             </a:endParaRPr>
           </a:p>
           <a:p>
-            <a:pPr marL="182880" lvl="0" indent="-182880">
+            <a:pPr marL="182880" indent="-182880">
+              <a:spcBef>
+                <a:spcPts val="0"/>
+              </a:spcBef>
+            </a:pPr>
+            <a:r>
+              <a:rPr lang="es-MX" dirty="0">
+                <a:solidFill>
+                  <a:srgbClr val="373A3C"/>
+                </a:solidFill>
+                <a:latin typeface="Arial"/>
+                <a:cs typeface="Arial"/>
+                <a:sym typeface="Arial"/>
+              </a:rPr>
+              <a:t>El problema (contexto)</a:t>
+            </a:r>
+          </a:p>
+          <a:p>
+            <a:pPr marL="182880" indent="-182880">
               <a:spcBef>
                 <a:spcPts val="0"/>
               </a:spcBef>
@@ -9116,11 +9355,53 @@
                 <a:cs typeface="Arial"/>
                 <a:sym typeface="Arial"/>
               </a:rPr>
-              <a:t>El problema (contexto)</a:t>
-            </a:r>
-          </a:p>
-          <a:p>
-            <a:pPr marL="182880" indent="-182880">
+              <a:t>Propósito del proyecto</a:t>
+            </a:r>
+          </a:p>
+          <a:p>
+            <a:pPr marL="0" indent="0">
+              <a:spcBef>
+                <a:spcPts val="0"/>
+              </a:spcBef>
+              <a:buNone/>
+            </a:pPr>
+            <a:endParaRPr dirty="0">
+              <a:solidFill>
+                <a:srgbClr val="373A3C"/>
+              </a:solidFill>
+              <a:latin typeface="Arial"/>
+              <a:cs typeface="Arial"/>
+            </a:endParaRPr>
+          </a:p>
+          <a:p>
+            <a:pPr marL="182880" lvl="0" indent="-182880">
+              <a:spcBef>
+                <a:spcPts val="0"/>
+              </a:spcBef>
+            </a:pPr>
+            <a:r>
+              <a:rPr lang="es-MX" dirty="0">
+                <a:solidFill>
+                  <a:srgbClr val="373A3C"/>
+                </a:solidFill>
+                <a:latin typeface="Arial"/>
+                <a:cs typeface="Arial"/>
+              </a:rPr>
+              <a:t>Flujo de trabajo y </a:t>
+            </a:r>
+            <a:r>
+              <a:rPr lang="es-ES" dirty="0">
+                <a:solidFill>
+                  <a:srgbClr val="373A3C"/>
+                </a:solidFill>
+                <a:latin typeface="Arial"/>
+                <a:cs typeface="Arial"/>
+              </a:rPr>
+              <a:t>descripción del proyecto</a:t>
+            </a:r>
+          </a:p>
+          <a:p>
+            <a:pPr marL="182880" lvl="0" indent="-182880">
               <a:spcBef>
                 <a:spcPts val="0"/>
               </a:spcBef>
@@ -9134,10 +9415,35 @@
             </a:endParaRPr>
           </a:p>
           <a:p>
-            <a:pPr marL="182880" indent="-182880">
-              <a:spcBef>
-                <a:spcPts val="0"/>
-              </a:spcBef>
+            <a:pPr marL="182880" lvl="0" indent="-182880">
+              <a:spcBef>
+                <a:spcPts val="0"/>
+              </a:spcBef>
+            </a:pPr>
+            <a:r>
+              <a:rPr lang="es-ES" dirty="0">
+                <a:solidFill>
+                  <a:srgbClr val="373A3C"/>
+                </a:solidFill>
+                <a:latin typeface="Arial"/>
+                <a:cs typeface="Arial"/>
+              </a:rPr>
+              <a:t>Métricas de evaluación</a:t>
+            </a:r>
+            <a:endParaRPr lang="es-MX" dirty="0">
+              <a:solidFill>
+                <a:srgbClr val="373A3C"/>
+              </a:solidFill>
+              <a:latin typeface="Arial"/>
+              <a:cs typeface="Arial"/>
+            </a:endParaRPr>
+          </a:p>
+          <a:p>
+            <a:pPr marL="0" lvl="0" indent="0">
+              <a:spcBef>
+                <a:spcPts val="0"/>
+              </a:spcBef>
+              <a:buNone/>
             </a:pPr>
             <a:endParaRPr dirty="0">
               <a:solidFill>
@@ -9160,95 +9466,17 @@
                 </a:solidFill>
                 <a:latin typeface="Arial"/>
                 <a:cs typeface="Arial"/>
-              </a:rPr>
-              <a:t>Flujo de trabajo y </a:t>
-            </a:r>
-            <a:r>
-              <a:rPr lang="es-ES" dirty="0">
-                <a:solidFill>
-                  <a:srgbClr val="373A3C"/>
-                </a:solidFill>
-                <a:latin typeface="Arial"/>
-                <a:cs typeface="Arial"/>
-              </a:rPr>
-              <a:t>descripción del proyecto</a:t>
-            </a:r>
-            <a:endParaRPr lang="es-MX" dirty="0">
-              <a:solidFill>
-                <a:srgbClr val="373A3C"/>
-              </a:solidFill>
-              <a:latin typeface="Arial"/>
-              <a:cs typeface="Arial"/>
-            </a:endParaRPr>
-          </a:p>
-          <a:p>
-            <a:pPr marL="0" lvl="0" indent="0">
-              <a:spcBef>
-                <a:spcPts val="0"/>
-              </a:spcBef>
-              <a:buNone/>
-            </a:pPr>
-            <a:endParaRPr lang="es-MX" dirty="0">
-              <a:solidFill>
-                <a:srgbClr val="373A3C"/>
-              </a:solidFill>
-              <a:latin typeface="Arial"/>
-              <a:cs typeface="Arial"/>
-              <a:sym typeface="Arial"/>
-            </a:endParaRPr>
-          </a:p>
-          <a:p>
-            <a:pPr marL="182880" lvl="0" indent="-182880">
-              <a:spcBef>
-                <a:spcPts val="0"/>
-              </a:spcBef>
-            </a:pPr>
-            <a:endParaRPr dirty="0">
-              <a:solidFill>
-                <a:srgbClr val="373A3C"/>
-              </a:solidFill>
-              <a:latin typeface="Arial"/>
-              <a:cs typeface="Arial"/>
-            </a:endParaRPr>
-          </a:p>
-          <a:p>
-            <a:pPr marL="182880" lvl="0" indent="-182880">
-              <a:spcBef>
-                <a:spcPts val="0"/>
-              </a:spcBef>
-            </a:pPr>
-            <a:r>
-              <a:rPr lang="es-MX" dirty="0">
-                <a:solidFill>
-                  <a:srgbClr val="373A3C"/>
-                </a:solidFill>
-                <a:latin typeface="Arial"/>
-                <a:cs typeface="Arial"/>
                 <a:sym typeface="Arial"/>
               </a:rPr>
               <a:t>Métodos y modelos</a:t>
             </a:r>
           </a:p>
           <a:p>
-            <a:pPr marL="182880" lvl="0" indent="-182880">
-              <a:spcBef>
-                <a:spcPts val="0"/>
-              </a:spcBef>
-            </a:pPr>
-            <a:endParaRPr lang="es-MX" dirty="0">
-              <a:solidFill>
-                <a:srgbClr val="373A3C"/>
-              </a:solidFill>
-              <a:latin typeface="Arial"/>
-              <a:cs typeface="Arial"/>
-              <a:sym typeface="Arial"/>
-            </a:endParaRPr>
-          </a:p>
-          <a:p>
-            <a:pPr marL="182880" lvl="0" indent="-182880">
-              <a:spcBef>
-                <a:spcPts val="0"/>
-              </a:spcBef>
+            <a:pPr marL="0" lvl="0" indent="0">
+              <a:spcBef>
+                <a:spcPts val="0"/>
+              </a:spcBef>
+              <a:buNone/>
             </a:pPr>
             <a:endParaRPr dirty="0">
               <a:solidFill>
@@ -10725,6 +10953,453 @@
           </a:bodyPr>
           <a:lstStyle/>
           <a:p>
+            <a:pPr lvl="1">
+              <a:lnSpc>
+                <a:spcPct val="85000"/>
+              </a:lnSpc>
+              <a:buClr>
+                <a:schemeClr val="accent1"/>
+              </a:buClr>
+              <a:buSzPts val="3200"/>
+            </a:pPr>
+            <a:r>
+              <a:rPr lang="es-MX" sz="3200" b="1" dirty="0">
+                <a:solidFill>
+                  <a:schemeClr val="accent1"/>
+                </a:solidFill>
+                <a:latin typeface="Calibri"/>
+                <a:cs typeface="Calibri"/>
+                <a:sym typeface="Calibri"/>
+              </a:rPr>
+              <a:t>Propósito del proyecto</a:t>
+            </a:r>
+            <a:endParaRPr sz="3200" b="1" dirty="0">
+              <a:solidFill>
+                <a:schemeClr val="accent1"/>
+              </a:solidFill>
+              <a:latin typeface="Calibri"/>
+              <a:ea typeface="Calibri"/>
+              <a:cs typeface="Calibri"/>
+              <a:sym typeface="Calibri"/>
+            </a:endParaRPr>
+          </a:p>
+        </p:txBody>
+      </p:sp>
+      <p:sp>
+        <p:nvSpPr>
+          <p:cNvPr id="4" name="CuadroTexto 3">
+            <a:extLst>
+              <a:ext uri="{FF2B5EF4-FFF2-40B4-BE49-F238E27FC236}">
+                <a16:creationId xmlns:a16="http://schemas.microsoft.com/office/drawing/2014/main" id="{3C34EECA-01AB-D8B5-6BF6-49DE8BA39557}"/>
+              </a:ext>
+            </a:extLst>
+          </p:cNvPr>
+          <p:cNvSpPr txBox="1"/>
+          <p:nvPr/>
+        </p:nvSpPr>
+        <p:spPr>
+          <a:xfrm>
+            <a:off x="863600" y="879959"/>
+            <a:ext cx="10617200" cy="738664"/>
+          </a:xfrm>
+          <a:prstGeom prst="rect">
+            <a:avLst/>
+          </a:prstGeom>
+          <a:noFill/>
+        </p:spPr>
+        <p:txBody>
+          <a:bodyPr wrap="square">
+            <a:spAutoFit/>
+          </a:bodyPr>
+          <a:lstStyle/>
+          <a:p>
+            <a:pPr algn="ctr"/>
+            <a:r>
+              <a:rPr lang="es-MX" sz="1400" b="0" i="0" u="none" strike="noStrike" dirty="0">
+                <a:solidFill>
+                  <a:srgbClr val="000000"/>
+                </a:solidFill>
+                <a:effectLst/>
+                <a:latin typeface="Calibri" panose="020F0502020204030204" pitchFamily="34" charset="0"/>
+              </a:rPr>
+              <a:t>De acuerdo con la Comisión Nacional de Hidrocarburos (CNH), se indicaba que en 2017 “El consumo de gas natural en México ha incrementado 32% en los últimos 12 años” y con base en la Consulta Pública 2019 del Centro Nacional de Control de Gas Natural (CENAGAS), la proyección de demanda nacional sería de casi 14,500 </a:t>
+            </a:r>
+            <a:r>
+              <a:rPr lang="es-MX" sz="1400" b="0" i="0" u="none" strike="noStrike" dirty="0" err="1">
+                <a:solidFill>
+                  <a:srgbClr val="000000"/>
+                </a:solidFill>
+                <a:effectLst/>
+                <a:latin typeface="Calibri" panose="020F0502020204030204" pitchFamily="34" charset="0"/>
+              </a:rPr>
+              <a:t>MMpcd</a:t>
+            </a:r>
+            <a:r>
+              <a:rPr lang="es-MX" sz="1400" b="0" i="0" u="none" strike="noStrike" dirty="0">
+                <a:solidFill>
+                  <a:srgbClr val="000000"/>
+                </a:solidFill>
+                <a:effectLst/>
+                <a:latin typeface="Calibri" panose="020F0502020204030204" pitchFamily="34" charset="0"/>
+              </a:rPr>
+              <a:t> para 2024</a:t>
+            </a:r>
+            <a:endParaRPr lang="es-MX" dirty="0"/>
+          </a:p>
+        </p:txBody>
+      </p:sp>
+      <p:pic>
+        <p:nvPicPr>
+          <p:cNvPr id="1026" name="Picture 2">
+            <a:extLst>
+              <a:ext uri="{FF2B5EF4-FFF2-40B4-BE49-F238E27FC236}">
+                <a16:creationId xmlns:a16="http://schemas.microsoft.com/office/drawing/2014/main" id="{0614C32E-2FA0-F3C4-6DAD-6D1152447B14}"/>
+              </a:ext>
+            </a:extLst>
+          </p:cNvPr>
+          <p:cNvPicPr>
+            <a:picLocks noChangeAspect="1" noChangeArrowheads="1"/>
+          </p:cNvPicPr>
+          <p:nvPr/>
+        </p:nvPicPr>
+        <p:blipFill>
+          <a:blip r:embed="rId3">
+            <a:extLst>
+              <a:ext uri="{28A0092B-C50C-407E-A947-70E740481C1C}">
+                <a14:useLocalDpi xmlns:a14="http://schemas.microsoft.com/office/drawing/2010/main" val="0"/>
+              </a:ext>
+            </a:extLst>
+          </a:blip>
+          <a:srcRect/>
+          <a:stretch>
+            <a:fillRect/>
+          </a:stretch>
+        </p:blipFill>
+        <p:spPr bwMode="auto">
+          <a:xfrm>
+            <a:off x="990600" y="2659592"/>
+            <a:ext cx="5105400" cy="2419350"/>
+          </a:xfrm>
+          <a:prstGeom prst="rect">
+            <a:avLst/>
+          </a:prstGeom>
+          <a:noFill/>
+          <a:extLst>
+            <a:ext uri="{909E8E84-426E-40DD-AFC4-6F175D3DCCD1}">
+              <a14:hiddenFill xmlns:a14="http://schemas.microsoft.com/office/drawing/2010/main">
+                <a:solidFill>
+                  <a:srgbClr val="FFFFFF"/>
+                </a:solidFill>
+              </a14:hiddenFill>
+            </a:ext>
+          </a:extLst>
+        </p:spPr>
+      </p:pic>
+      <p:sp>
+        <p:nvSpPr>
+          <p:cNvPr id="6" name="CuadroTexto 5">
+            <a:extLst>
+              <a:ext uri="{FF2B5EF4-FFF2-40B4-BE49-F238E27FC236}">
+                <a16:creationId xmlns:a16="http://schemas.microsoft.com/office/drawing/2014/main" id="{5BC34DC5-03D9-BC7E-5A46-AE5301AFEA9C}"/>
+              </a:ext>
+            </a:extLst>
+          </p:cNvPr>
+          <p:cNvSpPr txBox="1"/>
+          <p:nvPr/>
+        </p:nvSpPr>
+        <p:spPr>
+          <a:xfrm>
+            <a:off x="7021483" y="1820882"/>
+            <a:ext cx="4459317" cy="3970318"/>
+          </a:xfrm>
+          <a:prstGeom prst="rect">
+            <a:avLst/>
+          </a:prstGeom>
+          <a:noFill/>
+        </p:spPr>
+        <p:txBody>
+          <a:bodyPr wrap="square">
+            <a:spAutoFit/>
+          </a:bodyPr>
+          <a:lstStyle/>
+          <a:p>
+            <a:br>
+              <a:rPr lang="es-MX" b="0" dirty="0">
+                <a:solidFill>
+                  <a:srgbClr val="CCCCCC"/>
+                </a:solidFill>
+                <a:effectLst/>
+                <a:latin typeface="Consolas" panose="020B0609020204030204" pitchFamily="49" charset="0"/>
+              </a:rPr>
+            </a:br>
+            <a:r>
+              <a:rPr lang="es-MX" dirty="0">
+                <a:latin typeface="Calibri" panose="020F0502020204030204" pitchFamily="34" charset="0"/>
+              </a:rPr>
+              <a:t> </a:t>
+            </a:r>
+            <a:r>
+              <a:rPr lang="es-MX" b="1" dirty="0">
+                <a:latin typeface="Calibri" panose="020F0502020204030204" pitchFamily="34" charset="0"/>
+              </a:rPr>
+              <a:t>Selección del modelo: </a:t>
+            </a:r>
+            <a:r>
+              <a:rPr lang="es-MX" dirty="0">
+                <a:latin typeface="Calibri" panose="020F0502020204030204" pitchFamily="34" charset="0"/>
+              </a:rPr>
+              <a:t>Elegir uno o dos modelos adecuados tanto del análisis de series de tiempo como de las redes neuronales artificiales, en función de su capacidad para proporcionar pronósticos precisos en el panorama energético único de México.</a:t>
+            </a:r>
+          </a:p>
+          <a:p>
+            <a:endParaRPr lang="es-MX" dirty="0">
+              <a:latin typeface="Calibri" panose="020F0502020204030204" pitchFamily="34" charset="0"/>
+            </a:endParaRPr>
+          </a:p>
+          <a:p>
+            <a:r>
+              <a:rPr lang="es-MX" b="1" dirty="0">
+                <a:latin typeface="Calibri" panose="020F0502020204030204" pitchFamily="34" charset="0"/>
+              </a:rPr>
+              <a:t>Análisis de resultados: </a:t>
+            </a:r>
+            <a:r>
+              <a:rPr lang="es-MX" dirty="0">
+                <a:latin typeface="Calibri" panose="020F0502020204030204" pitchFamily="34" charset="0"/>
+              </a:rPr>
+              <a:t>Analizar rigurosamente los resultados generados por los modelos estadísticos elegidos bajo diversos escenarios, lo que permitirá una comprensión integral de los resultados potenciales.</a:t>
+            </a:r>
+          </a:p>
+          <a:p>
+            <a:endParaRPr lang="es-MX" dirty="0">
+              <a:latin typeface="Calibri" panose="020F0502020204030204" pitchFamily="34" charset="0"/>
+            </a:endParaRPr>
+          </a:p>
+          <a:p>
+            <a:r>
+              <a:rPr lang="es-MX" b="1" dirty="0">
+                <a:latin typeface="Calibri" panose="020F0502020204030204" pitchFamily="34" charset="0"/>
+              </a:rPr>
+              <a:t>Apoyo a la transición energética: </a:t>
+            </a:r>
+            <a:r>
+              <a:rPr lang="es-MX" dirty="0">
+                <a:latin typeface="Calibri" panose="020F0502020204030204" pitchFamily="34" charset="0"/>
+              </a:rPr>
+              <a:t>Ofrecer un apoyo analítico que permita tomar decisiones informadas sobre la transición de México hacia un futuro energético sostenible, considerando las dimensiones ambientales, económicas y sociales.</a:t>
+            </a:r>
+          </a:p>
+          <a:p>
+            <a:endParaRPr lang="es-MX" dirty="0">
+              <a:latin typeface="Calibri" panose="020F0502020204030204" pitchFamily="34" charset="0"/>
+            </a:endParaRPr>
+          </a:p>
+        </p:txBody>
+      </p:sp>
+      <p:sp>
+        <p:nvSpPr>
+          <p:cNvPr id="7" name="Oval 3">
+            <a:extLst>
+              <a:ext uri="{FF2B5EF4-FFF2-40B4-BE49-F238E27FC236}">
+                <a16:creationId xmlns:a16="http://schemas.microsoft.com/office/drawing/2014/main" id="{38F130E7-8313-B8C1-C62C-1D73446299D4}"/>
+              </a:ext>
+            </a:extLst>
+          </p:cNvPr>
+          <p:cNvSpPr/>
+          <p:nvPr/>
+        </p:nvSpPr>
+        <p:spPr>
+          <a:xfrm>
+            <a:off x="6558741" y="2082100"/>
+            <a:ext cx="468000" cy="468000"/>
+          </a:xfrm>
+          <a:prstGeom prst="ellipse">
+            <a:avLst/>
+          </a:prstGeom>
+        </p:spPr>
+        <p:style>
+          <a:lnRef idx="2">
+            <a:schemeClr val="accent1">
+              <a:shade val="50000"/>
+            </a:schemeClr>
+          </a:lnRef>
+          <a:fillRef idx="1">
+            <a:schemeClr val="accent1"/>
+          </a:fillRef>
+          <a:effectRef idx="0">
+            <a:schemeClr val="accent1"/>
+          </a:effectRef>
+          <a:fontRef idx="minor">
+            <a:schemeClr val="lt1"/>
+          </a:fontRef>
+        </p:style>
+        <p:txBody>
+          <a:bodyPr rtlCol="0" anchor="ctr"/>
+          <a:lstStyle/>
+          <a:p>
+            <a:pPr algn="ctr"/>
+            <a:r>
+              <a:rPr lang="es-MX" dirty="0"/>
+              <a:t>1</a:t>
+            </a:r>
+          </a:p>
+        </p:txBody>
+      </p:sp>
+      <p:sp>
+        <p:nvSpPr>
+          <p:cNvPr id="8" name="Oval 3">
+            <a:extLst>
+              <a:ext uri="{FF2B5EF4-FFF2-40B4-BE49-F238E27FC236}">
+                <a16:creationId xmlns:a16="http://schemas.microsoft.com/office/drawing/2014/main" id="{C83328EC-BA3F-FAF6-D205-FD5FE1304643}"/>
+              </a:ext>
+            </a:extLst>
+          </p:cNvPr>
+          <p:cNvSpPr/>
+          <p:nvPr/>
+        </p:nvSpPr>
+        <p:spPr>
+          <a:xfrm>
+            <a:off x="6558741" y="3327996"/>
+            <a:ext cx="468000" cy="468000"/>
+          </a:xfrm>
+          <a:prstGeom prst="ellipse">
+            <a:avLst/>
+          </a:prstGeom>
+        </p:spPr>
+        <p:style>
+          <a:lnRef idx="2">
+            <a:schemeClr val="accent1">
+              <a:shade val="50000"/>
+            </a:schemeClr>
+          </a:lnRef>
+          <a:fillRef idx="1">
+            <a:schemeClr val="accent1"/>
+          </a:fillRef>
+          <a:effectRef idx="0">
+            <a:schemeClr val="accent1"/>
+          </a:effectRef>
+          <a:fontRef idx="minor">
+            <a:schemeClr val="lt1"/>
+          </a:fontRef>
+        </p:style>
+        <p:txBody>
+          <a:bodyPr rtlCol="0" anchor="ctr"/>
+          <a:lstStyle/>
+          <a:p>
+            <a:pPr algn="ctr"/>
+            <a:r>
+              <a:rPr lang="es-ES" dirty="0"/>
+              <a:t>2</a:t>
+            </a:r>
+            <a:endParaRPr lang="es-MX" dirty="0"/>
+          </a:p>
+        </p:txBody>
+      </p:sp>
+      <p:sp>
+        <p:nvSpPr>
+          <p:cNvPr id="9" name="Oval 3">
+            <a:extLst>
+              <a:ext uri="{FF2B5EF4-FFF2-40B4-BE49-F238E27FC236}">
+                <a16:creationId xmlns:a16="http://schemas.microsoft.com/office/drawing/2014/main" id="{B98CB254-632C-F925-2740-38A2FFB658EB}"/>
+              </a:ext>
+            </a:extLst>
+          </p:cNvPr>
+          <p:cNvSpPr/>
+          <p:nvPr/>
+        </p:nvSpPr>
+        <p:spPr>
+          <a:xfrm>
+            <a:off x="6558741" y="4412462"/>
+            <a:ext cx="468000" cy="468000"/>
+          </a:xfrm>
+          <a:prstGeom prst="ellipse">
+            <a:avLst/>
+          </a:prstGeom>
+        </p:spPr>
+        <p:style>
+          <a:lnRef idx="2">
+            <a:schemeClr val="accent1">
+              <a:shade val="50000"/>
+            </a:schemeClr>
+          </a:lnRef>
+          <a:fillRef idx="1">
+            <a:schemeClr val="accent1"/>
+          </a:fillRef>
+          <a:effectRef idx="0">
+            <a:schemeClr val="accent1"/>
+          </a:effectRef>
+          <a:fontRef idx="minor">
+            <a:schemeClr val="lt1"/>
+          </a:fontRef>
+        </p:style>
+        <p:txBody>
+          <a:bodyPr rtlCol="0" anchor="ctr"/>
+          <a:lstStyle/>
+          <a:p>
+            <a:pPr algn="ctr"/>
+            <a:r>
+              <a:rPr lang="es-ES" dirty="0"/>
+              <a:t>3</a:t>
+            </a:r>
+            <a:endParaRPr lang="es-MX" dirty="0"/>
+          </a:p>
+        </p:txBody>
+      </p:sp>
+    </p:spTree>
+    <p:extLst>
+      <p:ext uri="{BB962C8B-B14F-4D97-AF65-F5344CB8AC3E}">
+        <p14:creationId xmlns:p14="http://schemas.microsoft.com/office/powerpoint/2010/main" val="1226657101"/>
+      </p:ext>
+    </p:extLst>
+  </p:cSld>
+  <p:clrMapOvr>
+    <a:masterClrMapping/>
+  </p:clrMapOvr>
+</p:sld>
+</file>
+
+<file path=ppt/slides/slide6.xml><?xml version="1.0" encoding="utf-8"?>
+<p:sld xmlns:a="http://schemas.openxmlformats.org/drawingml/2006/main" xmlns:r="http://schemas.openxmlformats.org/officeDocument/2006/relationships" xmlns:p="http://schemas.openxmlformats.org/presentationml/2006/main">
+  <p:cSld>
+    <p:spTree>
+      <p:nvGrpSpPr>
+        <p:cNvPr id="1" name="Shape 110"/>
+        <p:cNvGrpSpPr/>
+        <p:nvPr/>
+      </p:nvGrpSpPr>
+      <p:grpSpPr>
+        <a:xfrm>
+          <a:off x="0" y="0"/>
+          <a:ext cx="0" cy="0"/>
+          <a:chOff x="0" y="0"/>
+          <a:chExt cx="0" cy="0"/>
+        </a:xfrm>
+      </p:grpSpPr>
+      <p:sp>
+        <p:nvSpPr>
+          <p:cNvPr id="111" name="Google Shape;111;p4"/>
+          <p:cNvSpPr txBox="1"/>
+          <p:nvPr/>
+        </p:nvSpPr>
+        <p:spPr>
+          <a:xfrm>
+            <a:off x="510558" y="196996"/>
+            <a:ext cx="11658658" cy="1007542"/>
+          </a:xfrm>
+          <a:prstGeom prst="rect">
+            <a:avLst/>
+          </a:prstGeom>
+          <a:noFill/>
+          <a:ln>
+            <a:noFill/>
+          </a:ln>
+        </p:spPr>
+        <p:txBody>
+          <a:bodyPr spcFirstLastPara="1" wrap="square" lIns="91425" tIns="45700" rIns="91425" bIns="45700" anchor="t" anchorCtr="0">
+            <a:noAutofit/>
+          </a:bodyPr>
+          <a:lstStyle/>
+          <a:p>
             <a:pPr>
               <a:lnSpc>
                 <a:spcPct val="85000"/>
@@ -12716,7 +13391,452 @@
 </p:sld>
 </file>
 
-<file path=ppt/slides/slide6.xml><?xml version="1.0" encoding="utf-8"?>
+<file path=ppt/slides/slide7.xml><?xml version="1.0" encoding="utf-8"?>
+<p:sld xmlns:a="http://schemas.openxmlformats.org/drawingml/2006/main" xmlns:r="http://schemas.openxmlformats.org/officeDocument/2006/relationships" xmlns:p="http://schemas.openxmlformats.org/presentationml/2006/main">
+  <p:cSld>
+    <p:spTree>
+      <p:nvGrpSpPr>
+        <p:cNvPr id="1" name="Shape 110"/>
+        <p:cNvGrpSpPr/>
+        <p:nvPr/>
+      </p:nvGrpSpPr>
+      <p:grpSpPr>
+        <a:xfrm>
+          <a:off x="0" y="0"/>
+          <a:ext cx="0" cy="0"/>
+          <a:chOff x="0" y="0"/>
+          <a:chExt cx="0" cy="0"/>
+        </a:xfrm>
+      </p:grpSpPr>
+      <p:sp>
+        <p:nvSpPr>
+          <p:cNvPr id="111" name="Google Shape;111;p4"/>
+          <p:cNvSpPr txBox="1"/>
+          <p:nvPr/>
+        </p:nvSpPr>
+        <p:spPr>
+          <a:xfrm>
+            <a:off x="510558" y="196996"/>
+            <a:ext cx="11658658" cy="1007542"/>
+          </a:xfrm>
+          <a:prstGeom prst="rect">
+            <a:avLst/>
+          </a:prstGeom>
+          <a:noFill/>
+          <a:ln>
+            <a:noFill/>
+          </a:ln>
+        </p:spPr>
+        <p:txBody>
+          <a:bodyPr spcFirstLastPara="1" wrap="square" lIns="91425" tIns="45700" rIns="91425" bIns="45700" anchor="t" anchorCtr="0">
+            <a:noAutofit/>
+          </a:bodyPr>
+          <a:lstStyle/>
+          <a:p>
+            <a:pPr lvl="1">
+              <a:lnSpc>
+                <a:spcPct val="85000"/>
+              </a:lnSpc>
+              <a:buClr>
+                <a:schemeClr val="accent1"/>
+              </a:buClr>
+              <a:buSzPts val="3200"/>
+            </a:pPr>
+            <a:r>
+              <a:rPr lang="es-MX" sz="3200" b="1" dirty="0">
+                <a:solidFill>
+                  <a:schemeClr val="accent1"/>
+                </a:solidFill>
+                <a:latin typeface="Calibri"/>
+                <a:cs typeface="Calibri"/>
+                <a:sym typeface="Calibri"/>
+              </a:rPr>
+              <a:t>Métricas de evaluación</a:t>
+            </a:r>
+            <a:endParaRPr sz="3200" b="1" dirty="0">
+              <a:solidFill>
+                <a:schemeClr val="accent1"/>
+              </a:solidFill>
+              <a:latin typeface="Calibri"/>
+              <a:ea typeface="Calibri"/>
+              <a:cs typeface="Calibri"/>
+              <a:sym typeface="Calibri"/>
+            </a:endParaRPr>
+          </a:p>
+        </p:txBody>
+      </p:sp>
+      <p:pic>
+        <p:nvPicPr>
+          <p:cNvPr id="2050" name="Picture 2" descr="Root-Mean-Square Error in R Programming - GeeksforGeeks">
+            <a:extLst>
+              <a:ext uri="{FF2B5EF4-FFF2-40B4-BE49-F238E27FC236}">
+                <a16:creationId xmlns:a16="http://schemas.microsoft.com/office/drawing/2014/main" id="{E146418B-5A0A-D8CC-4044-F0A89D8FC52E}"/>
+              </a:ext>
+            </a:extLst>
+          </p:cNvPr>
+          <p:cNvPicPr>
+            <a:picLocks noChangeAspect="1" noChangeArrowheads="1"/>
+          </p:cNvPicPr>
+          <p:nvPr/>
+        </p:nvPicPr>
+        <p:blipFill>
+          <a:blip r:embed="rId3">
+            <a:extLst>
+              <a:ext uri="{28A0092B-C50C-407E-A947-70E740481C1C}">
+                <a14:useLocalDpi xmlns:a14="http://schemas.microsoft.com/office/drawing/2010/main" val="0"/>
+              </a:ext>
+            </a:extLst>
+          </a:blip>
+          <a:srcRect/>
+          <a:stretch>
+            <a:fillRect/>
+          </a:stretch>
+        </p:blipFill>
+        <p:spPr bwMode="auto">
+          <a:xfrm>
+            <a:off x="6929933" y="2851915"/>
+            <a:ext cx="3705225" cy="1238250"/>
+          </a:xfrm>
+          <a:prstGeom prst="rect">
+            <a:avLst/>
+          </a:prstGeom>
+          <a:noFill/>
+          <a:extLst>
+            <a:ext uri="{909E8E84-426E-40DD-AFC4-6F175D3DCCD1}">
+              <a14:hiddenFill xmlns:a14="http://schemas.microsoft.com/office/drawing/2010/main">
+                <a:solidFill>
+                  <a:srgbClr val="FFFFFF"/>
+                </a:solidFill>
+              </a14:hiddenFill>
+            </a:ext>
+          </a:extLst>
+        </p:spPr>
+      </p:pic>
+      <p:sp>
+        <p:nvSpPr>
+          <p:cNvPr id="3" name="CuadroTexto 2">
+            <a:extLst>
+              <a:ext uri="{FF2B5EF4-FFF2-40B4-BE49-F238E27FC236}">
+                <a16:creationId xmlns:a16="http://schemas.microsoft.com/office/drawing/2014/main" id="{47673C4C-D873-804F-E48B-6BDA01D2D811}"/>
+              </a:ext>
+            </a:extLst>
+          </p:cNvPr>
+          <p:cNvSpPr txBox="1"/>
+          <p:nvPr/>
+        </p:nvSpPr>
+        <p:spPr>
+          <a:xfrm>
+            <a:off x="6496545" y="604501"/>
+            <a:ext cx="4876801" cy="2062103"/>
+          </a:xfrm>
+          <a:prstGeom prst="rect">
+            <a:avLst/>
+          </a:prstGeom>
+          <a:noFill/>
+        </p:spPr>
+        <p:txBody>
+          <a:bodyPr wrap="square">
+            <a:spAutoFit/>
+          </a:bodyPr>
+          <a:lstStyle/>
+          <a:p>
+            <a:r>
+              <a:rPr lang="es-MX" sz="1600" b="1" dirty="0">
+                <a:latin typeface="Calibri" panose="020F0502020204030204" pitchFamily="34" charset="0"/>
+              </a:rPr>
+              <a:t>RMSE</a:t>
+            </a:r>
+          </a:p>
+          <a:p>
+            <a:r>
+              <a:rPr lang="es-MX" sz="1600" dirty="0">
+                <a:latin typeface="Calibri" panose="020F0502020204030204" pitchFamily="34" charset="0"/>
+              </a:rPr>
+              <a:t>-Ventaja(s) Esta en las mismas unidades que la variable estudiada, lo que permite tener una clara idea de cuanto puede costar el error promedio en los mismos términos de la variable de interés. </a:t>
+            </a:r>
+          </a:p>
+          <a:p>
+            <a:endParaRPr lang="es-MX" sz="1600" dirty="0">
+              <a:latin typeface="Calibri" panose="020F0502020204030204" pitchFamily="34" charset="0"/>
+            </a:endParaRPr>
+          </a:p>
+          <a:p>
+            <a:r>
+              <a:rPr lang="es-MX" sz="1600" dirty="0">
+                <a:latin typeface="Calibri" panose="020F0502020204030204" pitchFamily="34" charset="0"/>
+              </a:rPr>
+              <a:t>-Desventaja(s): Tiende a castigar mucho los valores atípicos. </a:t>
+            </a:r>
+          </a:p>
+        </p:txBody>
+      </p:sp>
+      <p:pic>
+        <p:nvPicPr>
+          <p:cNvPr id="2052" name="Picture 4" descr="MAPE (Erro Absoluto Percentual Médio) em Machine Learning | Mario Filho |  Machine Learning">
+            <a:extLst>
+              <a:ext uri="{FF2B5EF4-FFF2-40B4-BE49-F238E27FC236}">
+                <a16:creationId xmlns:a16="http://schemas.microsoft.com/office/drawing/2014/main" id="{6DDCA7A7-F7D9-C37C-AAEA-E00A90D26E38}"/>
+              </a:ext>
+            </a:extLst>
+          </p:cNvPr>
+          <p:cNvPicPr>
+            <a:picLocks noChangeAspect="1" noChangeArrowheads="1"/>
+          </p:cNvPicPr>
+          <p:nvPr/>
+        </p:nvPicPr>
+        <p:blipFill rotWithShape="1">
+          <a:blip r:embed="rId4">
+            <a:extLst>
+              <a:ext uri="{28A0092B-C50C-407E-A947-70E740481C1C}">
+                <a14:useLocalDpi xmlns:a14="http://schemas.microsoft.com/office/drawing/2010/main" val="0"/>
+              </a:ext>
+            </a:extLst>
+          </a:blip>
+          <a:srcRect t="26628" b="25288"/>
+          <a:stretch/>
+        </p:blipFill>
+        <p:spPr bwMode="auto">
+          <a:xfrm>
+            <a:off x="1421375" y="2745085"/>
+            <a:ext cx="2762250" cy="796925"/>
+          </a:xfrm>
+          <a:prstGeom prst="rect">
+            <a:avLst/>
+          </a:prstGeom>
+          <a:noFill/>
+          <a:extLst>
+            <a:ext uri="{909E8E84-426E-40DD-AFC4-6F175D3DCCD1}">
+              <a14:hiddenFill xmlns:a14="http://schemas.microsoft.com/office/drawing/2010/main">
+                <a:solidFill>
+                  <a:srgbClr val="FFFFFF"/>
+                </a:solidFill>
+              </a14:hiddenFill>
+            </a:ext>
+          </a:extLst>
+        </p:spPr>
+      </p:pic>
+      <p:sp>
+        <p:nvSpPr>
+          <p:cNvPr id="10" name="CuadroTexto 9">
+            <a:extLst>
+              <a:ext uri="{FF2B5EF4-FFF2-40B4-BE49-F238E27FC236}">
+                <a16:creationId xmlns:a16="http://schemas.microsoft.com/office/drawing/2014/main" id="{C30A9B2A-5A26-93C7-19AB-D772ADAF148B}"/>
+              </a:ext>
+            </a:extLst>
+          </p:cNvPr>
+          <p:cNvSpPr txBox="1"/>
+          <p:nvPr/>
+        </p:nvSpPr>
+        <p:spPr>
+          <a:xfrm>
+            <a:off x="683188" y="604501"/>
+            <a:ext cx="4876800" cy="2062103"/>
+          </a:xfrm>
+          <a:prstGeom prst="rect">
+            <a:avLst/>
+          </a:prstGeom>
+          <a:noFill/>
+        </p:spPr>
+        <p:txBody>
+          <a:bodyPr wrap="square">
+            <a:spAutoFit/>
+          </a:bodyPr>
+          <a:lstStyle/>
+          <a:p>
+            <a:r>
+              <a:rPr lang="es-MX" sz="1600" b="1" dirty="0">
+                <a:latin typeface="Calibri" panose="020F0502020204030204" pitchFamily="34" charset="0"/>
+              </a:rPr>
+              <a:t>MAPE</a:t>
+            </a:r>
+          </a:p>
+          <a:p>
+            <a:r>
+              <a:rPr lang="es-MX" sz="1600" dirty="0">
+                <a:latin typeface="Calibri" panose="020F0502020204030204" pitchFamily="34" charset="0"/>
+              </a:rPr>
+              <a:t>-Ventaja(s) Es muy útil cuando se quieren evaluar dos modelos en términos de porcentaje promedio /medio de error.</a:t>
+            </a:r>
+          </a:p>
+          <a:p>
+            <a:r>
+              <a:rPr lang="es-MX" sz="1600" dirty="0">
+                <a:latin typeface="Calibri" panose="020F0502020204030204" pitchFamily="34" charset="0"/>
+              </a:rPr>
+              <a:t>-Desventaja(s): Tiende a dispararse si la media de los datos tiende a cero.</a:t>
+            </a:r>
+          </a:p>
+          <a:p>
+            <a:br>
+              <a:rPr lang="es-MX" sz="1600" b="0" dirty="0">
+                <a:solidFill>
+                  <a:srgbClr val="CCCCCC"/>
+                </a:solidFill>
+                <a:effectLst/>
+                <a:latin typeface="Consolas" panose="020B0609020204030204" pitchFamily="49" charset="0"/>
+              </a:rPr>
+            </a:br>
+            <a:endParaRPr lang="es-MX" sz="1600" b="0" dirty="0">
+              <a:solidFill>
+                <a:srgbClr val="CCCCCC"/>
+              </a:solidFill>
+              <a:effectLst/>
+              <a:latin typeface="Consolas" panose="020B0609020204030204" pitchFamily="49" charset="0"/>
+            </a:endParaRPr>
+          </a:p>
+        </p:txBody>
+      </p:sp>
+      <p:sp>
+        <p:nvSpPr>
+          <p:cNvPr id="12" name="CuadroTexto 11">
+            <a:extLst>
+              <a:ext uri="{FF2B5EF4-FFF2-40B4-BE49-F238E27FC236}">
+                <a16:creationId xmlns:a16="http://schemas.microsoft.com/office/drawing/2014/main" id="{70A03265-B746-B994-C9AB-BF59A928AE40}"/>
+              </a:ext>
+            </a:extLst>
+          </p:cNvPr>
+          <p:cNvSpPr txBox="1"/>
+          <p:nvPr/>
+        </p:nvSpPr>
+        <p:spPr>
+          <a:xfrm>
+            <a:off x="2150533" y="4212495"/>
+            <a:ext cx="7569200" cy="830997"/>
+          </a:xfrm>
+          <a:prstGeom prst="rect">
+            <a:avLst/>
+          </a:prstGeom>
+          <a:noFill/>
+        </p:spPr>
+        <p:txBody>
+          <a:bodyPr wrap="square">
+            <a:spAutoFit/>
+          </a:bodyPr>
+          <a:lstStyle/>
+          <a:p>
+            <a:r>
+              <a:rPr lang="es-MX" sz="1600" b="1" dirty="0">
+                <a:latin typeface="Calibri" panose="020F0502020204030204" pitchFamily="34" charset="0"/>
+              </a:rPr>
+              <a:t>AIC </a:t>
+            </a:r>
+            <a:r>
+              <a:rPr lang="es-MX" sz="1600" dirty="0">
+                <a:latin typeface="Calibri" panose="020F0502020204030204" pitchFamily="34" charset="0"/>
+              </a:rPr>
+              <a:t>combina la verosimilitud del modelo con el número de parámetros utilizados, priorizando los modelos que ofrecen un equilibrio entre el ajuste a los datos y la simplicidad</a:t>
+            </a:r>
+          </a:p>
+        </p:txBody>
+      </p:sp>
+      <p:pic>
+        <p:nvPicPr>
+          <p:cNvPr id="2056" name="Picture 8" descr="The Akaike Information Criterion – Time Series Analysis, Regression, and  Forecasting">
+            <a:extLst>
+              <a:ext uri="{FF2B5EF4-FFF2-40B4-BE49-F238E27FC236}">
+                <a16:creationId xmlns:a16="http://schemas.microsoft.com/office/drawing/2014/main" id="{D7342021-FA5F-9D68-B93F-0086A8953A22}"/>
+              </a:ext>
+            </a:extLst>
+          </p:cNvPr>
+          <p:cNvPicPr>
+            <a:picLocks noChangeAspect="1" noChangeArrowheads="1"/>
+          </p:cNvPicPr>
+          <p:nvPr/>
+        </p:nvPicPr>
+        <p:blipFill>
+          <a:blip r:embed="rId5">
+            <a:extLst>
+              <a:ext uri="{28A0092B-C50C-407E-A947-70E740481C1C}">
+                <a14:useLocalDpi xmlns:a14="http://schemas.microsoft.com/office/drawing/2010/main" val="0"/>
+              </a:ext>
+            </a:extLst>
+          </a:blip>
+          <a:srcRect/>
+          <a:stretch>
+            <a:fillRect/>
+          </a:stretch>
+        </p:blipFill>
+        <p:spPr bwMode="auto">
+          <a:xfrm>
+            <a:off x="7923792" y="5043492"/>
+            <a:ext cx="1717505" cy="1242589"/>
+          </a:xfrm>
+          <a:prstGeom prst="rect">
+            <a:avLst/>
+          </a:prstGeom>
+          <a:noFill/>
+          <a:extLst>
+            <a:ext uri="{909E8E84-426E-40DD-AFC4-6F175D3DCCD1}">
+              <a14:hiddenFill xmlns:a14="http://schemas.microsoft.com/office/drawing/2010/main">
+                <a:solidFill>
+                  <a:srgbClr val="FFFFFF"/>
+                </a:solidFill>
+              </a14:hiddenFill>
+            </a:ext>
+          </a:extLst>
+        </p:spPr>
+      </p:pic>
+      <p:pic>
+        <p:nvPicPr>
+          <p:cNvPr id="2058" name="Picture 10" descr="Akaike Information Criterion: Model Selection | by Aditya Manikantan | Geek  Culture | Medium">
+            <a:extLst>
+              <a:ext uri="{FF2B5EF4-FFF2-40B4-BE49-F238E27FC236}">
+                <a16:creationId xmlns:a16="http://schemas.microsoft.com/office/drawing/2014/main" id="{19F492A3-E029-8AD5-890B-3D54372B452D}"/>
+              </a:ext>
+            </a:extLst>
+          </p:cNvPr>
+          <p:cNvPicPr>
+            <a:picLocks noChangeAspect="1" noChangeArrowheads="1"/>
+          </p:cNvPicPr>
+          <p:nvPr/>
+        </p:nvPicPr>
+        <p:blipFill>
+          <a:blip r:embed="rId6">
+            <a:extLst>
+              <a:ext uri="{28A0092B-C50C-407E-A947-70E740481C1C}">
+                <a14:useLocalDpi xmlns:a14="http://schemas.microsoft.com/office/drawing/2010/main" val="0"/>
+              </a:ext>
+            </a:extLst>
+          </a:blip>
+          <a:srcRect/>
+          <a:stretch>
+            <a:fillRect/>
+          </a:stretch>
+        </p:blipFill>
+        <p:spPr bwMode="auto">
+          <a:xfrm>
+            <a:off x="4542882" y="5033136"/>
+            <a:ext cx="1953663" cy="1087754"/>
+          </a:xfrm>
+          <a:prstGeom prst="rect">
+            <a:avLst/>
+          </a:prstGeom>
+          <a:noFill/>
+          <a:extLst>
+            <a:ext uri="{909E8E84-426E-40DD-AFC4-6F175D3DCCD1}">
+              <a14:hiddenFill xmlns:a14="http://schemas.microsoft.com/office/drawing/2010/main">
+                <a:solidFill>
+                  <a:srgbClr val="FFFFFF"/>
+                </a:solidFill>
+              </a14:hiddenFill>
+            </a:ext>
+          </a:extLst>
+        </p:spPr>
+      </p:pic>
+    </p:spTree>
+    <p:extLst>
+      <p:ext uri="{BB962C8B-B14F-4D97-AF65-F5344CB8AC3E}">
+        <p14:creationId xmlns:p14="http://schemas.microsoft.com/office/powerpoint/2010/main" val="2010681991"/>
+      </p:ext>
+    </p:extLst>
+  </p:cSld>
+  <p:clrMapOvr>
+    <a:masterClrMapping/>
+  </p:clrMapOvr>
+</p:sld>
+</file>
+
+<file path=ppt/slides/slide8.xml><?xml version="1.0" encoding="utf-8"?>
 <p:sld xmlns:a="http://schemas.openxmlformats.org/drawingml/2006/main" xmlns:r="http://schemas.openxmlformats.org/officeDocument/2006/relationships" xmlns:p="http://schemas.openxmlformats.org/presentationml/2006/main">
   <p:cSld>
     <p:spTree>
@@ -16499,7 +17619,7 @@
 </p:sld>
 </file>
 
-<file path=ppt/slides/slide7.xml><?xml version="1.0" encoding="utf-8"?>
+<file path=ppt/slides/slide9.xml><?xml version="1.0" encoding="utf-8"?>
 <p:sld xmlns:a="http://schemas.openxmlformats.org/drawingml/2006/main" xmlns:r="http://schemas.openxmlformats.org/officeDocument/2006/relationships" xmlns:p="http://schemas.openxmlformats.org/presentationml/2006/main">
   <p:cSld>
     <p:spTree>
@@ -17320,7 +18440,7 @@
                 <a:latin typeface="Calibri Light" panose="020F0302020204030204" pitchFamily="34" charset="0"/>
                 <a:cs typeface="Calibri Light" panose="020F0302020204030204" pitchFamily="34" charset="0"/>
               </a:rPr>
-              <a:t>(RNN, LSTM etc.)</a:t>
+              <a:t>(LSTM etc.)</a:t>
             </a:r>
             <a:endParaRPr lang="es-MX" sz="1000" dirty="0">
               <a:solidFill>

</xml_diff>